<commit_message>
feat(pptx): add intro slide with title/date, styled thank-you slide, and improved color formatting
</commit_message>
<xml_diff>
--- a/output/Cats:_Companions_for_Children_and_Elderly_Dogs.pptx
+++ b/output/Cats:_Companions_for_Children_and_Elderly_Dogs.pptx
@@ -5,7 +5,6 @@
     <p:sldMasterId id="2147483648" r:id="rId1"/>
   </p:sldMasterIdLst>
   <p:sldIdLst>
-    <p:sldId id="256" r:id="rId2"/>
     <p:sldId id="257" r:id="rId7"/>
     <p:sldId id="258" r:id="rId8"/>
     <p:sldId id="259" r:id="rId9"/>
@@ -17,6 +16,7 @@
     <p:sldId id="265" r:id="rId15"/>
     <p:sldId id="266" r:id="rId16"/>
     <p:sldId id="267" r:id="rId17"/>
+    <p:sldId id="268" r:id="rId18"/>
   </p:sldIdLst>
   <p:sldSz cx="12192000" cy="6858000"/>
   <p:notesSz cx="6858000" cy="9144000"/>
@@ -3421,7 +3421,7 @@
           <a:lstStyle/>
           <a:p>
             <a:r>
-              <a:t>Key Takeaways</a:t>
+              <a:t>Key Considerations</a:t>
             </a:r>
           </a:p>
         </p:txBody>
@@ -3441,28 +3441,40 @@
           <a:bodyPr/>
           <a:lstStyle/>
           <a:p>
-            <a:pPr/>
-            <a:r>
-              <a:t>Choose breeds known for their gentle nature</a:t>
-            </a:r>
-          </a:p>
-          <a:p>
-            <a:pPr/>
-            <a:r>
-              <a:t>Introduce cats gradually to children and dogs</a:t>
-            </a:r>
-          </a:p>
-          <a:p>
-            <a:pPr/>
-            <a:r>
-              <a:t>Monitor interactions to ensure safety</a:t>
+            <a:pPr>
+              <a:defRPr sz="1800"/>
+            </a:pPr>
+            <a:r>
+              <a:t>Assess the temperament of both the cat and existing pets</a:t>
+            </a:r>
+          </a:p>
+          <a:p>
+            <a:pPr>
+              <a:defRPr sz="1800"/>
+            </a:pPr>
+            <a:r>
+              <a:t>Ensure children understand how to interact with cats</a:t>
+            </a:r>
+          </a:p>
+          <a:p>
+            <a:pPr>
+              <a:defRPr sz="1800"/>
+            </a:pPr>
+            <a:r>
+              <a:t>Provide regular veterinary care</a:t>
             </a:r>
           </a:p>
           <a:p/>
           <a:p>
-            <a:pPr/>
-            <a:r>
-              <a:t>Key Message: With the right approach, cats can be wonderful companions for children and elderly dogs.</a:t>
+            <a:pPr>
+              <a:defRPr sz="1800" b="1">
+                <a:solidFill>
+                  <a:srgbClr val="FF69B4"/>
+                </a:solidFill>
+              </a:defRPr>
+            </a:pPr>
+            <a:r>
+              <a:t>Successful integration depends on understanding and preparation.</a:t>
             </a:r>
           </a:p>
         </p:txBody>
@@ -3501,7 +3513,7 @@
           <a:lstStyle/>
           <a:p>
             <a:r>
-              <a:t>Conclusion</a:t>
+              <a:t>Key Takeaways</a:t>
             </a:r>
           </a:p>
         </p:txBody>
@@ -3521,28 +3533,40 @@
           <a:bodyPr/>
           <a:lstStyle/>
           <a:p>
-            <a:pPr/>
-            <a:r>
-              <a:t>Cats can enrich the lives of children and elderly dogs</a:t>
-            </a:r>
-          </a:p>
-          <a:p>
-            <a:pPr/>
-            <a:r>
-              <a:t>Choosing the right breed is crucial</a:t>
-            </a:r>
-          </a:p>
-          <a:p>
-            <a:pPr/>
-            <a:r>
-              <a:t>Proper introduction and care lead to successful companionship</a:t>
+            <a:pPr>
+              <a:defRPr sz="1800"/>
+            </a:pPr>
+            <a:r>
+              <a:t>Choose breeds known for their gentle nature</a:t>
+            </a:r>
+          </a:p>
+          <a:p>
+            <a:pPr>
+              <a:defRPr sz="1800"/>
+            </a:pPr>
+            <a:r>
+              <a:t>Introduce cats gradually to children and dogs</a:t>
+            </a:r>
+          </a:p>
+          <a:p>
+            <a:pPr>
+              <a:defRPr sz="1800"/>
+            </a:pPr>
+            <a:r>
+              <a:t>Monitor interactions to ensure safety</a:t>
             </a:r>
           </a:p>
           <a:p/>
           <a:p>
-            <a:pPr/>
-            <a:r>
-              <a:t>Key Message: Cats are versatile companions that can fit well into various family dynamics.</a:t>
+            <a:pPr>
+              <a:defRPr sz="1800" b="1">
+                <a:solidFill>
+                  <a:srgbClr val="FF69B4"/>
+                </a:solidFill>
+              </a:defRPr>
+            </a:pPr>
+            <a:r>
+              <a:t>With the right approach, cats can be wonderful companions for children and elderly dogs.</a:t>
             </a:r>
           </a:p>
         </p:txBody>
@@ -3581,6 +3605,98 @@
           <a:lstStyle/>
           <a:p>
             <a:r>
+              <a:t>Conclusion</a:t>
+            </a:r>
+          </a:p>
+        </p:txBody>
+      </p:sp>
+      <p:sp>
+        <p:nvSpPr>
+          <p:cNvPr id="3" name="Content Placeholder 2"/>
+          <p:cNvSpPr>
+            <a:spLocks noGrp="1"/>
+          </p:cNvSpPr>
+          <p:nvPr>
+            <p:ph idx="1"/>
+          </p:nvPr>
+        </p:nvSpPr>
+        <p:spPr/>
+        <p:txBody>
+          <a:bodyPr/>
+          <a:lstStyle/>
+          <a:p>
+            <a:pPr>
+              <a:defRPr sz="1800"/>
+            </a:pPr>
+            <a:r>
+              <a:t>Cats can enrich the lives of children and elderly dogs</a:t>
+            </a:r>
+          </a:p>
+          <a:p>
+            <a:pPr>
+              <a:defRPr sz="1800"/>
+            </a:pPr>
+            <a:r>
+              <a:t>Choosing the right breed is crucial</a:t>
+            </a:r>
+          </a:p>
+          <a:p>
+            <a:pPr>
+              <a:defRPr sz="1800"/>
+            </a:pPr>
+            <a:r>
+              <a:t>Proper introduction and care lead to successful companionship</a:t>
+            </a:r>
+          </a:p>
+          <a:p/>
+          <a:p>
+            <a:pPr>
+              <a:defRPr sz="1800" b="1">
+                <a:solidFill>
+                  <a:srgbClr val="FF69B4"/>
+                </a:solidFill>
+              </a:defRPr>
+            </a:pPr>
+            <a:r>
+              <a:t>Cats are versatile companions that can fit well into various family dynamics.</a:t>
+            </a:r>
+          </a:p>
+        </p:txBody>
+      </p:sp>
+    </p:spTree>
+  </p:cSld>
+  <p:clrMapOvr>
+    <a:masterClrMapping/>
+  </p:clrMapOvr>
+</p:sld>
+</file>
+
+<file path=ppt/slides/slide13.xml><?xml version="1.0" encoding="utf-8"?>
+<p:sld xmlns:a="http://schemas.openxmlformats.org/drawingml/2006/main" xmlns:p="http://schemas.openxmlformats.org/presentationml/2006/main" xmlns:r="http://schemas.openxmlformats.org/officeDocument/2006/relationships">
+  <p:cSld>
+    <p:spTree>
+      <p:nvGrpSpPr>
+        <p:cNvPr id="1" name=""/>
+        <p:cNvGrpSpPr/>
+        <p:nvPr/>
+      </p:nvGrpSpPr>
+      <p:grpSpPr/>
+      <p:sp>
+        <p:nvSpPr>
+          <p:cNvPr id="2" name="Title 1"/>
+          <p:cNvSpPr>
+            <a:spLocks noGrp="1"/>
+          </p:cNvSpPr>
+          <p:nvPr>
+            <p:ph type="title"/>
+          </p:nvPr>
+        </p:nvSpPr>
+        <p:spPr/>
+        <p:txBody>
+          <a:bodyPr/>
+          <a:lstStyle/>
+          <a:p>
+            <a:r>
               <a:t>Thank You</a:t>
             </a:r>
           </a:p>
@@ -3601,22 +3717,32 @@
           <a:bodyPr/>
           <a:lstStyle/>
           <a:p>
-            <a:pPr/>
+            <a:pPr>
+              <a:defRPr sz="1800"/>
+            </a:pPr>
             <a:r>
               <a:t>Thank you for your attention</a:t>
             </a:r>
           </a:p>
           <a:p>
-            <a:pPr/>
+            <a:pPr>
+              <a:defRPr sz="1800"/>
+            </a:pPr>
             <a:r>
               <a:t>Questions and discussions are welcome</a:t>
             </a:r>
           </a:p>
           <a:p/>
           <a:p>
-            <a:pPr/>
-            <a:r>
-              <a:t>Key Message: We appreciate your interest in finding the right cat for your family.</a:t>
+            <a:pPr>
+              <a:defRPr sz="1800" b="1">
+                <a:solidFill>
+                  <a:srgbClr val="FF69B4"/>
+                </a:solidFill>
+              </a:defRPr>
+            </a:pPr>
+            <a:r>
+              <a:t>We appreciate your interest in finding the right cat for your family.</a:t>
             </a:r>
           </a:p>
         </p:txBody>
@@ -3646,51 +3772,37 @@
             <a:spLocks noGrp="1"/>
           </p:cNvSpPr>
           <p:nvPr>
-            <p:ph type="title"/>
-          </p:nvPr>
-        </p:nvSpPr>
-        <p:spPr/>
-        <p:txBody>
-          <a:bodyPr/>
-          <a:lstStyle/>
-          <a:p>
-            <a:r>
-              <a:t>Introduction</a:t>
-            </a:r>
-          </a:p>
-        </p:txBody>
-      </p:sp>
-      <p:sp>
-        <p:nvSpPr>
-          <p:cNvPr id="3" name="Content Placeholder 2"/>
-          <p:cNvSpPr>
-            <a:spLocks noGrp="1"/>
-          </p:cNvSpPr>
-          <p:nvPr>
-            <p:ph idx="1"/>
-          </p:nvPr>
-        </p:nvSpPr>
-        <p:spPr/>
-        <p:txBody>
-          <a:bodyPr/>
-          <a:lstStyle/>
-          <a:p>
-            <a:pPr/>
-            <a:r>
-              <a:t>Date: October 2023</a:t>
-            </a:r>
-          </a:p>
-          <a:p>
-            <a:pPr/>
-            <a:r>
-              <a:t>Topic: Cats as Companions for Children and Elderly Dogs</a:t>
-            </a:r>
-          </a:p>
-          <a:p/>
-          <a:p>
-            <a:pPr/>
-            <a:r>
-              <a:t>Key Message: Exploring the best cat breeds for families with young children and senior dogs.</a:t>
+            <p:ph type="ctrTitle"/>
+          </p:nvPr>
+        </p:nvSpPr>
+        <p:spPr/>
+        <p:txBody>
+          <a:bodyPr/>
+          <a:lstStyle/>
+          <a:p>
+            <a:r>
+              <a:t>Cats: Companions for Children and Elderly Dogs</a:t>
+            </a:r>
+          </a:p>
+        </p:txBody>
+      </p:sp>
+      <p:sp>
+        <p:nvSpPr>
+          <p:cNvPr id="3" name="Subtitle 2"/>
+          <p:cNvSpPr>
+            <a:spLocks noGrp="1"/>
+          </p:cNvSpPr>
+          <p:nvPr>
+            <p:ph type="subTitle" idx="1"/>
+          </p:nvPr>
+        </p:nvSpPr>
+        <p:spPr/>
+        <p:txBody>
+          <a:bodyPr/>
+          <a:lstStyle/>
+          <a:p>
+            <a:r>
+              <a:t>An AI-generated presentation</a:t>
             </a:r>
           </a:p>
         </p:txBody>
@@ -3729,7 +3841,7 @@
           <a:lstStyle/>
           <a:p>
             <a:r>
-              <a:t>Why Choose a Cat?</a:t>
+              <a:t>Introduction</a:t>
             </a:r>
           </a:p>
         </p:txBody>
@@ -3749,28 +3861,32 @@
           <a:bodyPr/>
           <a:lstStyle/>
           <a:p>
-            <a:pPr/>
-            <a:r>
-              <a:t>Cats are independent yet affectionate</a:t>
-            </a:r>
-          </a:p>
-          <a:p>
-            <a:pPr/>
-            <a:r>
-              <a:t>Low maintenance compared to dogs</a:t>
-            </a:r>
-          </a:p>
-          <a:p>
-            <a:pPr/>
-            <a:r>
-              <a:t>Provide companionship and entertainment</a:t>
+            <a:pPr>
+              <a:defRPr sz="1800"/>
+            </a:pPr>
+            <a:r>
+              <a:t>Date: October 2023</a:t>
+            </a:r>
+          </a:p>
+          <a:p>
+            <a:pPr>
+              <a:defRPr sz="1800"/>
+            </a:pPr>
+            <a:r>
+              <a:t>Topic: Cats as Companions for Children and Elderly Dogs</a:t>
             </a:r>
           </a:p>
           <a:p/>
           <a:p>
-            <a:pPr/>
-            <a:r>
-              <a:t>Key Message: Cats offer a balance of independence and companionship.</a:t>
+            <a:pPr>
+              <a:defRPr sz="1800" b="1">
+                <a:solidFill>
+                  <a:srgbClr val="FF69B4"/>
+                </a:solidFill>
+              </a:defRPr>
+            </a:pPr>
+            <a:r>
+              <a:t>Exploring the best cat breeds for families with young children and senior dogs.</a:t>
             </a:r>
           </a:p>
         </p:txBody>
@@ -3809,7 +3925,7 @@
           <a:lstStyle/>
           <a:p>
             <a:r>
-              <a:t>Ideal Cat Breeds for Children</a:t>
+              <a:t>Why Choose a Cat?</a:t>
             </a:r>
           </a:p>
         </p:txBody>
@@ -3829,28 +3945,40 @@
           <a:bodyPr/>
           <a:lstStyle/>
           <a:p>
-            <a:pPr/>
-            <a:r>
-              <a:t>Ragdoll: Gentle and tolerant</a:t>
-            </a:r>
-          </a:p>
-          <a:p>
-            <a:pPr/>
-            <a:r>
-              <a:t>Maine Coon: Friendly and playful</a:t>
-            </a:r>
-          </a:p>
-          <a:p>
-            <a:pPr/>
-            <a:r>
-              <a:t>British Shorthair: Calm and easygoing</a:t>
+            <a:pPr>
+              <a:defRPr sz="1800"/>
+            </a:pPr>
+            <a:r>
+              <a:t>Cats are independent yet affectionate</a:t>
+            </a:r>
+          </a:p>
+          <a:p>
+            <a:pPr>
+              <a:defRPr sz="1800"/>
+            </a:pPr>
+            <a:r>
+              <a:t>Low maintenance compared to dogs</a:t>
+            </a:r>
+          </a:p>
+          <a:p>
+            <a:pPr>
+              <a:defRPr sz="1800"/>
+            </a:pPr>
+            <a:r>
+              <a:t>Provide companionship and entertainment</a:t>
             </a:r>
           </a:p>
           <a:p/>
           <a:p>
-            <a:pPr/>
-            <a:r>
-              <a:t>Key Message: These breeds are known for their gentle nature and patience with children.</a:t>
+            <a:pPr>
+              <a:defRPr sz="1800" b="1">
+                <a:solidFill>
+                  <a:srgbClr val="FF69B4"/>
+                </a:solidFill>
+              </a:defRPr>
+            </a:pPr>
+            <a:r>
+              <a:t>Cats offer a balance of independence and companionship.</a:t>
             </a:r>
           </a:p>
         </p:txBody>
@@ -3889,7 +4017,7 @@
           <a:lstStyle/>
           <a:p>
             <a:r>
-              <a:t>Ideal Cat Breeds for Elderly Dogs</a:t>
+              <a:t>Ideal Cat Breeds for Children</a:t>
             </a:r>
           </a:p>
         </p:txBody>
@@ -3909,28 +4037,40 @@
           <a:bodyPr/>
           <a:lstStyle/>
           <a:p>
-            <a:pPr/>
-            <a:r>
-              <a:t>Birman: Sociable and adaptable</a:t>
-            </a:r>
-          </a:p>
-          <a:p>
-            <a:pPr/>
-            <a:r>
-              <a:t>Siberian: Calm and friendly</a:t>
-            </a:r>
-          </a:p>
-          <a:p>
-            <a:pPr/>
-            <a:r>
-              <a:t>Scottish Fold: Quiet and easygoing</a:t>
+            <a:pPr>
+              <a:defRPr sz="1800"/>
+            </a:pPr>
+            <a:r>
+              <a:t>Ragdoll: Gentle and tolerant</a:t>
+            </a:r>
+          </a:p>
+          <a:p>
+            <a:pPr>
+              <a:defRPr sz="1800"/>
+            </a:pPr>
+            <a:r>
+              <a:t>Maine Coon: Friendly and playful</a:t>
+            </a:r>
+          </a:p>
+          <a:p>
+            <a:pPr>
+              <a:defRPr sz="1800"/>
+            </a:pPr>
+            <a:r>
+              <a:t>British Shorthair: Calm and easygoing</a:t>
             </a:r>
           </a:p>
           <a:p/>
           <a:p>
-            <a:pPr/>
-            <a:r>
-              <a:t>Key Message: These breeds are known for their calm demeanor and adaptability.</a:t>
+            <a:pPr>
+              <a:defRPr sz="1800" b="1">
+                <a:solidFill>
+                  <a:srgbClr val="FF69B4"/>
+                </a:solidFill>
+              </a:defRPr>
+            </a:pPr>
+            <a:r>
+              <a:t>These breeds are known for their gentle nature and patience with children.</a:t>
             </a:r>
           </a:p>
         </p:txBody>
@@ -3969,7 +4109,7 @@
           <a:lstStyle/>
           <a:p>
             <a:r>
-              <a:t>Case Study: Ragdoll Cats with Children</a:t>
+              <a:t>Ideal Cat Breeds for Elderly Dogs</a:t>
             </a:r>
           </a:p>
         </p:txBody>
@@ -3989,28 +4129,40 @@
           <a:bodyPr/>
           <a:lstStyle/>
           <a:p>
-            <a:pPr/>
-            <a:r>
-              <a:t>Ragdolls are known for their docile nature</a:t>
-            </a:r>
-          </a:p>
-          <a:p>
-            <a:pPr/>
-            <a:r>
-              <a:t>They enjoy being held and cuddled</a:t>
-            </a:r>
-          </a:p>
-          <a:p>
-            <a:pPr/>
-            <a:r>
-              <a:t>Often described as 'puppy-like' due to their affectionate behavior</a:t>
+            <a:pPr>
+              <a:defRPr sz="1800"/>
+            </a:pPr>
+            <a:r>
+              <a:t>Birman: Sociable and adaptable</a:t>
+            </a:r>
+          </a:p>
+          <a:p>
+            <a:pPr>
+              <a:defRPr sz="1800"/>
+            </a:pPr>
+            <a:r>
+              <a:t>Siberian: Calm and friendly</a:t>
+            </a:r>
+          </a:p>
+          <a:p>
+            <a:pPr>
+              <a:defRPr sz="1800"/>
+            </a:pPr>
+            <a:r>
+              <a:t>Scottish Fold: Quiet and easygoing</a:t>
             </a:r>
           </a:p>
           <a:p/>
           <a:p>
-            <a:pPr/>
-            <a:r>
-              <a:t>Key Message: Ragdolls are an excellent choice for families with young children.</a:t>
+            <a:pPr>
+              <a:defRPr sz="1800" b="1">
+                <a:solidFill>
+                  <a:srgbClr val="FF69B4"/>
+                </a:solidFill>
+              </a:defRPr>
+            </a:pPr>
+            <a:r>
+              <a:t>These breeds are known for their calm demeanor and adaptability.</a:t>
             </a:r>
           </a:p>
         </p:txBody>
@@ -4049,7 +4201,7 @@
           <a:lstStyle/>
           <a:p>
             <a:r>
-              <a:t>Case Study: Birman Cats with Elderly Dogs</a:t>
+              <a:t>Case Study: Ragdoll Cats with Children</a:t>
             </a:r>
           </a:p>
         </p:txBody>
@@ -4069,28 +4221,40 @@
           <a:bodyPr/>
           <a:lstStyle/>
           <a:p>
-            <a:pPr/>
-            <a:r>
-              <a:t>Birmans are known for their gentle and friendly nature</a:t>
-            </a:r>
-          </a:p>
-          <a:p>
-            <a:pPr/>
-            <a:r>
-              <a:t>They easily adapt to living with dogs</a:t>
-            </a:r>
-          </a:p>
-          <a:p>
-            <a:pPr/>
-            <a:r>
-              <a:t>Often form strong bonds with canine companions</a:t>
+            <a:pPr>
+              <a:defRPr sz="1800"/>
+            </a:pPr>
+            <a:r>
+              <a:t>Ragdolls are known for their docile nature</a:t>
+            </a:r>
+          </a:p>
+          <a:p>
+            <a:pPr>
+              <a:defRPr sz="1800"/>
+            </a:pPr>
+            <a:r>
+              <a:t>They enjoy being held and cuddled</a:t>
+            </a:r>
+          </a:p>
+          <a:p>
+            <a:pPr>
+              <a:defRPr sz="1800"/>
+            </a:pPr>
+            <a:r>
+              <a:t>Often described as 'puppy-like' due to their affectionate behavior</a:t>
             </a:r>
           </a:p>
           <a:p/>
           <a:p>
-            <a:pPr/>
-            <a:r>
-              <a:t>Key Message: Birmans can be great companions for elderly dogs.</a:t>
+            <a:pPr>
+              <a:defRPr sz="1800" b="1">
+                <a:solidFill>
+                  <a:srgbClr val="FF69B4"/>
+                </a:solidFill>
+              </a:defRPr>
+            </a:pPr>
+            <a:r>
+              <a:t>Ragdolls are an excellent choice for families with young children.</a:t>
             </a:r>
           </a:p>
         </p:txBody>
@@ -4129,7 +4293,7 @@
           <a:lstStyle/>
           <a:p>
             <a:r>
-              <a:t>Step-by-Step: Introducing a Cat to Your Home</a:t>
+              <a:t>Case Study: Birman Cats with Elderly Dogs</a:t>
             </a:r>
           </a:p>
         </p:txBody>
@@ -4149,40 +4313,40 @@
           <a:bodyPr/>
           <a:lstStyle/>
           <a:p>
-            <a:pPr/>
-            <a:r>
-              <a:t>Choose the right breed for your family &gt;&gt;</a:t>
-            </a:r>
-          </a:p>
-          <a:p>
-            <a:pPr/>
-            <a:r>
-              <a:t>Prepare your home with necessary supplies &gt;&gt;</a:t>
-            </a:r>
-          </a:p>
-          <a:p>
-            <a:pPr/>
-            <a:r>
-              <a:t>Introduce the cat to the family gradually &gt;&gt;</a:t>
-            </a:r>
-          </a:p>
-          <a:p>
-            <a:pPr/>
-            <a:r>
-              <a:t>Monitor interactions with children and dogs &gt;&gt;</a:t>
-            </a:r>
-          </a:p>
-          <a:p>
-            <a:pPr/>
-            <a:r>
-              <a:t>Provide a safe space for the cat to retreat</a:t>
+            <a:pPr>
+              <a:defRPr sz="1800"/>
+            </a:pPr>
+            <a:r>
+              <a:t>Birmans are known for their gentle and friendly nature</a:t>
+            </a:r>
+          </a:p>
+          <a:p>
+            <a:pPr>
+              <a:defRPr sz="1800"/>
+            </a:pPr>
+            <a:r>
+              <a:t>They easily adapt to living with dogs</a:t>
+            </a:r>
+          </a:p>
+          <a:p>
+            <a:pPr>
+              <a:defRPr sz="1800"/>
+            </a:pPr>
+            <a:r>
+              <a:t>Often form strong bonds with canine companions</a:t>
             </a:r>
           </a:p>
           <a:p/>
           <a:p>
-            <a:pPr/>
-            <a:r>
-              <a:t>Key Message: A careful introduction ensures a harmonious household.</a:t>
+            <a:pPr>
+              <a:defRPr sz="1800" b="1">
+                <a:solidFill>
+                  <a:srgbClr val="FF69B4"/>
+                </a:solidFill>
+              </a:defRPr>
+            </a:pPr>
+            <a:r>
+              <a:t>Birmans can be great companions for elderly dogs.</a:t>
             </a:r>
           </a:p>
         </p:txBody>
@@ -4221,7 +4385,7 @@
           <a:lstStyle/>
           <a:p>
             <a:r>
-              <a:t>Key Considerations</a:t>
+              <a:t>Step-by-Step: Introducing a Cat to Your Home</a:t>
             </a:r>
           </a:p>
         </p:txBody>
@@ -4241,28 +4405,56 @@
           <a:bodyPr/>
           <a:lstStyle/>
           <a:p>
-            <a:pPr/>
-            <a:r>
-              <a:t>Assess the temperament of both the cat and existing pets</a:t>
-            </a:r>
-          </a:p>
-          <a:p>
-            <a:pPr/>
-            <a:r>
-              <a:t>Ensure children understand how to interact with cats</a:t>
-            </a:r>
-          </a:p>
-          <a:p>
-            <a:pPr/>
-            <a:r>
-              <a:t>Provide regular veterinary care</a:t>
+            <a:pPr>
+              <a:defRPr sz="1800"/>
+            </a:pPr>
+            <a:r>
+              <a:t>Choose the right breed for your family &gt;&gt;</a:t>
+            </a:r>
+          </a:p>
+          <a:p>
+            <a:pPr>
+              <a:defRPr sz="1800"/>
+            </a:pPr>
+            <a:r>
+              <a:t>Prepare your home with necessary supplies &gt;&gt;</a:t>
+            </a:r>
+          </a:p>
+          <a:p>
+            <a:pPr>
+              <a:defRPr sz="1800"/>
+            </a:pPr>
+            <a:r>
+              <a:t>Introduce the cat to the family gradually &gt;&gt;</a:t>
+            </a:r>
+          </a:p>
+          <a:p>
+            <a:pPr>
+              <a:defRPr sz="1800"/>
+            </a:pPr>
+            <a:r>
+              <a:t>Monitor interactions with children and dogs &gt;&gt;</a:t>
+            </a:r>
+          </a:p>
+          <a:p>
+            <a:pPr>
+              <a:defRPr sz="1800"/>
+            </a:pPr>
+            <a:r>
+              <a:t>Provide a safe space for the cat to retreat</a:t>
             </a:r>
           </a:p>
           <a:p/>
           <a:p>
-            <a:pPr/>
-            <a:r>
-              <a:t>Key Message: Successful integration depends on understanding and preparation.</a:t>
+            <a:pPr>
+              <a:defRPr sz="1800" b="1">
+                <a:solidFill>
+                  <a:srgbClr val="FF69B4"/>
+                </a:solidFill>
+              </a:defRPr>
+            </a:pPr>
+            <a:r>
+              <a:t>A careful introduction ensures a harmonious household.</a:t>
             </a:r>
           </a:p>
         </p:txBody>

</xml_diff>